<commit_message>
updated comments and cleanup; added slide
</commit_message>
<xml_diff>
--- a/capstone1_covid-19.pptx
+++ b/capstone1_covid-19.pptx
@@ -16,7 +16,8 @@
     <p:sldId id="264" r:id="rId10"/>
     <p:sldId id="265" r:id="rId11"/>
     <p:sldId id="266" r:id="rId12"/>
-    <p:sldId id="267" r:id="rId13"/>
+    <p:sldId id="268" r:id="rId13"/>
+    <p:sldId id="267" r:id="rId14"/>
   </p:sldIdLst>
   <p:sldSz cx="12192000" cy="6858000"/>
   <p:notesSz cx="6858000" cy="9144000"/>
@@ -115,6 +116,11 @@
       </a:defRPr>
     </a:lvl9pPr>
   </p:defaultTextStyle>
+  <p:extLst>
+    <p:ext uri="{EFAFB233-063F-42B5-8137-9DF3F51BA10A}">
+      <p15:sldGuideLst xmlns:p15="http://schemas.microsoft.com/office/powerpoint/2012/main"/>
+    </p:ext>
+  </p:extLst>
 </p:presentation>
 </file>
 
@@ -265,7 +271,7 @@
           <a:p>
             <a:fld id="{FB10CA61-95E7-4AA5-87FC-9689C59CF03A}" type="datetimeFigureOut">
               <a:rPr lang="en-US" smtClean="0"/>
-              <a:t>5/13/2020</a:t>
+              <a:t>5/19/2020</a:t>
             </a:fld>
             <a:endParaRPr lang="en-US"/>
           </a:p>
@@ -463,7 +469,7 @@
           <a:p>
             <a:fld id="{FB10CA61-95E7-4AA5-87FC-9689C59CF03A}" type="datetimeFigureOut">
               <a:rPr lang="en-US" smtClean="0"/>
-              <a:t>5/13/2020</a:t>
+              <a:t>5/19/2020</a:t>
             </a:fld>
             <a:endParaRPr lang="en-US"/>
           </a:p>
@@ -671,7 +677,7 @@
           <a:p>
             <a:fld id="{FB10CA61-95E7-4AA5-87FC-9689C59CF03A}" type="datetimeFigureOut">
               <a:rPr lang="en-US" smtClean="0"/>
-              <a:t>5/13/2020</a:t>
+              <a:t>5/19/2020</a:t>
             </a:fld>
             <a:endParaRPr lang="en-US"/>
           </a:p>
@@ -869,7 +875,7 @@
           <a:p>
             <a:fld id="{FB10CA61-95E7-4AA5-87FC-9689C59CF03A}" type="datetimeFigureOut">
               <a:rPr lang="en-US" smtClean="0"/>
-              <a:t>5/13/2020</a:t>
+              <a:t>5/19/2020</a:t>
             </a:fld>
             <a:endParaRPr lang="en-US"/>
           </a:p>
@@ -1144,7 +1150,7 @@
           <a:p>
             <a:fld id="{FB10CA61-95E7-4AA5-87FC-9689C59CF03A}" type="datetimeFigureOut">
               <a:rPr lang="en-US" smtClean="0"/>
-              <a:t>5/13/2020</a:t>
+              <a:t>5/19/2020</a:t>
             </a:fld>
             <a:endParaRPr lang="en-US"/>
           </a:p>
@@ -1409,7 +1415,7 @@
           <a:p>
             <a:fld id="{FB10CA61-95E7-4AA5-87FC-9689C59CF03A}" type="datetimeFigureOut">
               <a:rPr lang="en-US" smtClean="0"/>
-              <a:t>5/13/2020</a:t>
+              <a:t>5/19/2020</a:t>
             </a:fld>
             <a:endParaRPr lang="en-US"/>
           </a:p>
@@ -1821,7 +1827,7 @@
           <a:p>
             <a:fld id="{FB10CA61-95E7-4AA5-87FC-9689C59CF03A}" type="datetimeFigureOut">
               <a:rPr lang="en-US" smtClean="0"/>
-              <a:t>5/13/2020</a:t>
+              <a:t>5/19/2020</a:t>
             </a:fld>
             <a:endParaRPr lang="en-US"/>
           </a:p>
@@ -1962,7 +1968,7 @@
           <a:p>
             <a:fld id="{FB10CA61-95E7-4AA5-87FC-9689C59CF03A}" type="datetimeFigureOut">
               <a:rPr lang="en-US" smtClean="0"/>
-              <a:t>5/13/2020</a:t>
+              <a:t>5/19/2020</a:t>
             </a:fld>
             <a:endParaRPr lang="en-US"/>
           </a:p>
@@ -2075,7 +2081,7 @@
           <a:p>
             <a:fld id="{FB10CA61-95E7-4AA5-87FC-9689C59CF03A}" type="datetimeFigureOut">
               <a:rPr lang="en-US" smtClean="0"/>
-              <a:t>5/13/2020</a:t>
+              <a:t>5/19/2020</a:t>
             </a:fld>
             <a:endParaRPr lang="en-US"/>
           </a:p>
@@ -2386,7 +2392,7 @@
           <a:p>
             <a:fld id="{FB10CA61-95E7-4AA5-87FC-9689C59CF03A}" type="datetimeFigureOut">
               <a:rPr lang="en-US" smtClean="0"/>
-              <a:t>5/13/2020</a:t>
+              <a:t>5/19/2020</a:t>
             </a:fld>
             <a:endParaRPr lang="en-US"/>
           </a:p>
@@ -2674,7 +2680,7 @@
           <a:p>
             <a:fld id="{FB10CA61-95E7-4AA5-87FC-9689C59CF03A}" type="datetimeFigureOut">
               <a:rPr lang="en-US" smtClean="0"/>
-              <a:t>5/13/2020</a:t>
+              <a:t>5/19/2020</a:t>
             </a:fld>
             <a:endParaRPr lang="en-US"/>
           </a:p>
@@ -2915,7 +2921,7 @@
           <a:p>
             <a:fld id="{FB10CA61-95E7-4AA5-87FC-9689C59CF03A}" type="datetimeFigureOut">
               <a:rPr lang="en-US" smtClean="0"/>
-              <a:t>5/13/2020</a:t>
+              <a:t>5/19/2020</a:t>
             </a:fld>
             <a:endParaRPr lang="en-US"/>
           </a:p>
@@ -3632,6 +3638,120 @@
           <p:cNvPr id="2" name="Title 1">
             <a:extLst>
               <a:ext uri="{FF2B5EF4-FFF2-40B4-BE49-F238E27FC236}">
+                <a16:creationId xmlns:a16="http://schemas.microsoft.com/office/drawing/2014/main" id="{DEEAE500-C576-4585-8D98-352313F61674}"/>
+              </a:ext>
+            </a:extLst>
+          </p:cNvPr>
+          <p:cNvSpPr>
+            <a:spLocks noGrp="1"/>
+          </p:cNvSpPr>
+          <p:nvPr>
+            <p:ph type="title"/>
+          </p:nvPr>
+        </p:nvSpPr>
+        <p:spPr/>
+        <p:txBody>
+          <a:bodyPr/>
+          <a:lstStyle/>
+          <a:p>
+            <a:r>
+              <a:rPr lang="en-US" dirty="0"/>
+              <a:t>Distribution of deaths per day;</a:t>
+            </a:r>
+            <a:br>
+              <a:rPr lang="en-US" dirty="0"/>
+            </a:br>
+            <a:r>
+              <a:rPr lang="en-US" dirty="0"/>
+              <a:t>Lockdown vs Pre-Lockdown</a:t>
+            </a:r>
+          </a:p>
+        </p:txBody>
+      </p:sp>
+      <p:pic>
+        <p:nvPicPr>
+          <p:cNvPr id="1028" name="Picture 4">
+            <a:extLst>
+              <a:ext uri="{FF2B5EF4-FFF2-40B4-BE49-F238E27FC236}">
+                <a16:creationId xmlns:a16="http://schemas.microsoft.com/office/drawing/2014/main" id="{6521E36C-B64B-4CC0-9A25-2D661BD8CB1B}"/>
+              </a:ext>
+            </a:extLst>
+          </p:cNvPr>
+          <p:cNvPicPr>
+            <a:picLocks noGrp="1" noChangeAspect="1" noChangeArrowheads="1"/>
+          </p:cNvPicPr>
+          <p:nvPr>
+            <p:ph idx="1"/>
+          </p:nvPr>
+        </p:nvPicPr>
+        <p:blipFill>
+          <a:blip r:embed="rId2">
+            <a:extLst>
+              <a:ext uri="{28A0092B-C50C-407E-A947-70E740481C1C}">
+                <a14:useLocalDpi xmlns:a14="http://schemas.microsoft.com/office/drawing/2010/main" val="0"/>
+              </a:ext>
+            </a:extLst>
+          </a:blip>
+          <a:srcRect/>
+          <a:stretch>
+            <a:fillRect/>
+          </a:stretch>
+        </p:blipFill>
+        <p:spPr bwMode="auto">
+          <a:xfrm>
+            <a:off x="838200" y="1690689"/>
+            <a:ext cx="10515599" cy="5167312"/>
+          </a:xfrm>
+          <a:prstGeom prst="rect">
+            <a:avLst/>
+          </a:prstGeom>
+          <a:noFill/>
+          <a:extLst>
+            <a:ext uri="{909E8E84-426E-40DD-AFC4-6F175D3DCCD1}">
+              <a14:hiddenFill xmlns:a14="http://schemas.microsoft.com/office/drawing/2010/main">
+                <a:solidFill>
+                  <a:srgbClr val="FFFFFF"/>
+                </a:solidFill>
+              </a14:hiddenFill>
+            </a:ext>
+          </a:extLst>
+        </p:spPr>
+      </p:pic>
+    </p:spTree>
+    <p:extLst>
+      <p:ext uri="{BB962C8B-B14F-4D97-AF65-F5344CB8AC3E}">
+        <p14:creationId xmlns:p14="http://schemas.microsoft.com/office/powerpoint/2010/main" val="88890859"/>
+      </p:ext>
+    </p:extLst>
+  </p:cSld>
+  <p:clrMapOvr>
+    <a:masterClrMapping/>
+  </p:clrMapOvr>
+</p:sld>
+</file>
+
+<file path=ppt/slides/slide13.xml><?xml version="1.0" encoding="utf-8"?>
+<p:sld xmlns:a="http://schemas.openxmlformats.org/drawingml/2006/main" xmlns:r="http://schemas.openxmlformats.org/officeDocument/2006/relationships" xmlns:p="http://schemas.openxmlformats.org/presentationml/2006/main">
+  <p:cSld>
+    <p:spTree>
+      <p:nvGrpSpPr>
+        <p:cNvPr id="1" name=""/>
+        <p:cNvGrpSpPr/>
+        <p:nvPr/>
+      </p:nvGrpSpPr>
+      <p:grpSpPr>
+        <a:xfrm>
+          <a:off x="0" y="0"/>
+          <a:ext cx="0" cy="0"/>
+          <a:chOff x="0" y="0"/>
+          <a:chExt cx="0" cy="0"/>
+        </a:xfrm>
+      </p:grpSpPr>
+      <p:sp>
+        <p:nvSpPr>
+          <p:cNvPr id="2" name="Title 1">
+            <a:extLst>
+              <a:ext uri="{FF2B5EF4-FFF2-40B4-BE49-F238E27FC236}">
                 <a16:creationId xmlns:a16="http://schemas.microsoft.com/office/drawing/2014/main" id="{BDAC04A9-F77C-4509-9B66-06173FFDFF42}"/>
               </a:ext>
             </a:extLst>
@@ -3782,7 +3902,7 @@
               <a:rPr lang="en-US" altLang="en-US" sz="1800" dirty="0">
                 <a:latin typeface="Arial" panose="020B0604020202020204" pitchFamily="34" charset="0"/>
               </a:rPr>
-              <a:t>(statistic=0.0, </a:t>
+              <a:t>: (statistic=0.0, </a:t>
             </a:r>
             <a:r>
               <a:rPr lang="en-US" altLang="en-US" sz="1800" dirty="0" err="1">

</xml_diff>